<commit_message>
data and additions to dof ppt
</commit_message>
<xml_diff>
--- a/I76Testing-DOF.pptx
+++ b/I76Testing-DOF.pptx
@@ -290,7 +290,7 @@
           <a:p>
             <a:fld id="{97463B0A-A052-41D6-B9C5-4B8A8974F401}" type="datetimeFigureOut">
               <a:rPr lang="en-US" smtClean="0"/>
-              <a:t>7/27/2016</a:t>
+              <a:t>7/28/2016</a:t>
             </a:fld>
             <a:endParaRPr lang="en-US"/>
           </a:p>
@@ -460,7 +460,7 @@
           <a:p>
             <a:fld id="{97463B0A-A052-41D6-B9C5-4B8A8974F401}" type="datetimeFigureOut">
               <a:rPr lang="en-US" smtClean="0"/>
-              <a:t>7/27/2016</a:t>
+              <a:t>7/28/2016</a:t>
             </a:fld>
             <a:endParaRPr lang="en-US"/>
           </a:p>
@@ -640,7 +640,7 @@
           <a:p>
             <a:fld id="{97463B0A-A052-41D6-B9C5-4B8A8974F401}" type="datetimeFigureOut">
               <a:rPr lang="en-US" smtClean="0"/>
-              <a:t>7/27/2016</a:t>
+              <a:t>7/28/2016</a:t>
             </a:fld>
             <a:endParaRPr lang="en-US"/>
           </a:p>
@@ -810,7 +810,7 @@
           <a:p>
             <a:fld id="{97463B0A-A052-41D6-B9C5-4B8A8974F401}" type="datetimeFigureOut">
               <a:rPr lang="en-US" smtClean="0"/>
-              <a:t>7/27/2016</a:t>
+              <a:t>7/28/2016</a:t>
             </a:fld>
             <a:endParaRPr lang="en-US"/>
           </a:p>
@@ -1056,7 +1056,7 @@
           <a:p>
             <a:fld id="{97463B0A-A052-41D6-B9C5-4B8A8974F401}" type="datetimeFigureOut">
               <a:rPr lang="en-US" smtClean="0"/>
-              <a:t>7/27/2016</a:t>
+              <a:t>7/28/2016</a:t>
             </a:fld>
             <a:endParaRPr lang="en-US"/>
           </a:p>
@@ -1344,7 +1344,7 @@
           <a:p>
             <a:fld id="{97463B0A-A052-41D6-B9C5-4B8A8974F401}" type="datetimeFigureOut">
               <a:rPr lang="en-US" smtClean="0"/>
-              <a:t>7/27/2016</a:t>
+              <a:t>7/28/2016</a:t>
             </a:fld>
             <a:endParaRPr lang="en-US"/>
           </a:p>
@@ -1766,7 +1766,7 @@
           <a:p>
             <a:fld id="{97463B0A-A052-41D6-B9C5-4B8A8974F401}" type="datetimeFigureOut">
               <a:rPr lang="en-US" smtClean="0"/>
-              <a:t>7/27/2016</a:t>
+              <a:t>7/28/2016</a:t>
             </a:fld>
             <a:endParaRPr lang="en-US"/>
           </a:p>
@@ -1884,7 +1884,7 @@
           <a:p>
             <a:fld id="{97463B0A-A052-41D6-B9C5-4B8A8974F401}" type="datetimeFigureOut">
               <a:rPr lang="en-US" smtClean="0"/>
-              <a:t>7/27/2016</a:t>
+              <a:t>7/28/2016</a:t>
             </a:fld>
             <a:endParaRPr lang="en-US"/>
           </a:p>
@@ -1979,7 +1979,7 @@
           <a:p>
             <a:fld id="{97463B0A-A052-41D6-B9C5-4B8A8974F401}" type="datetimeFigureOut">
               <a:rPr lang="en-US" smtClean="0"/>
-              <a:t>7/27/2016</a:t>
+              <a:t>7/28/2016</a:t>
             </a:fld>
             <a:endParaRPr lang="en-US"/>
           </a:p>
@@ -2256,7 +2256,7 @@
           <a:p>
             <a:fld id="{97463B0A-A052-41D6-B9C5-4B8A8974F401}" type="datetimeFigureOut">
               <a:rPr lang="en-US" smtClean="0"/>
-              <a:t>7/27/2016</a:t>
+              <a:t>7/28/2016</a:t>
             </a:fld>
             <a:endParaRPr lang="en-US"/>
           </a:p>
@@ -2509,7 +2509,7 @@
           <a:p>
             <a:fld id="{97463B0A-A052-41D6-B9C5-4B8A8974F401}" type="datetimeFigureOut">
               <a:rPr lang="en-US" smtClean="0"/>
-              <a:t>7/27/2016</a:t>
+              <a:t>7/28/2016</a:t>
             </a:fld>
             <a:endParaRPr lang="en-US"/>
           </a:p>
@@ -2722,7 +2722,7 @@
           <a:p>
             <a:fld id="{97463B0A-A052-41D6-B9C5-4B8A8974F401}" type="datetimeFigureOut">
               <a:rPr lang="en-US" smtClean="0"/>
-              <a:t>7/27/2016</a:t>
+              <a:t>7/28/2016</a:t>
             </a:fld>
             <a:endParaRPr lang="en-US"/>
           </a:p>
@@ -5020,8 +5020,8 @@
           <p:nvPr/>
         </p:nvSpPr>
         <p:spPr>
-          <a:xfrm rot="5400000" flipV="1">
-            <a:off x="4505787" y="954405"/>
+          <a:xfrm rot="10800000" flipV="1">
+            <a:off x="4505787" y="457200"/>
             <a:ext cx="152400" cy="152400"/>
           </a:xfrm>
           <a:prstGeom prst="triangle">
@@ -5159,7 +5159,6 @@
               <a:rPr lang="en-US" b="1" dirty="0"/>
               <a:t>2</a:t>
             </a:r>
-            <a:endParaRPr lang="en-US" b="1" dirty="0"/>
           </a:p>
         </p:txBody>
       </p:sp>
@@ -5189,7 +5188,6 @@
               <a:rPr lang="en-US" b="1" dirty="0"/>
               <a:t>3</a:t>
             </a:r>
-            <a:endParaRPr lang="en-US" b="1" dirty="0"/>
           </a:p>
         </p:txBody>
       </p:sp>
@@ -5681,7 +5679,7 @@
         </p:nvSpPr>
         <p:spPr>
           <a:xfrm>
-            <a:off x="4800600" y="838200"/>
+            <a:off x="4572000" y="304800"/>
             <a:ext cx="418704" cy="369332"/>
           </a:xfrm>
           <a:prstGeom prst="rect">
@@ -5789,7 +5787,6 @@
               <a:rPr lang="en-US" b="1" dirty="0"/>
               <a:t>5</a:t>
             </a:r>
-            <a:endParaRPr lang="en-US" b="1" dirty="0"/>
           </a:p>
         </p:txBody>
       </p:sp>
@@ -6888,7 +6885,7 @@
         </p:nvSpPr>
         <p:spPr>
           <a:xfrm>
-            <a:off x="1862103" y="1828800"/>
+            <a:off x="1862103" y="1867420"/>
             <a:ext cx="228600" cy="228600"/>
           </a:xfrm>
           <a:prstGeom prst="ellipse">
@@ -6928,7 +6925,7 @@
         </p:nvSpPr>
         <p:spPr>
           <a:xfrm>
-            <a:off x="7043703" y="1828800"/>
+            <a:off x="7043703" y="1867420"/>
             <a:ext cx="228600" cy="228600"/>
           </a:xfrm>
           <a:prstGeom prst="ellipse">
@@ -7014,7 +7011,7 @@
         </p:nvSpPr>
         <p:spPr>
           <a:xfrm rot="16200000" flipV="1">
-            <a:off x="2322713" y="1876148"/>
+            <a:off x="2322713" y="1867421"/>
             <a:ext cx="288386" cy="228600"/>
           </a:xfrm>
           <a:prstGeom prst="triangle">
@@ -7054,7 +7051,7 @@
         </p:nvSpPr>
         <p:spPr>
           <a:xfrm rot="5400000" flipV="1">
-            <a:off x="6705600" y="1866900"/>
+            <a:off x="6705600" y="1905520"/>
             <a:ext cx="152400" cy="152400"/>
           </a:xfrm>
           <a:prstGeom prst="triangle">
@@ -7644,6 +7641,264 @@
               <a:t>(TYP)</a:t>
             </a:r>
             <a:endParaRPr lang="en-US" b="1" dirty="0"/>
+          </a:p>
+        </p:txBody>
+      </p:sp>
+      <p:cxnSp>
+        <p:nvCxnSpPr>
+          <p:cNvPr id="10" name="Straight Connector 9"/>
+          <p:cNvCxnSpPr/>
+          <p:nvPr/>
+        </p:nvCxnSpPr>
+        <p:spPr>
+          <a:xfrm flipH="1" flipV="1">
+            <a:off x="1219200" y="1979148"/>
+            <a:ext cx="1247706" cy="5144"/>
+          </a:xfrm>
+          <a:prstGeom prst="line">
+            <a:avLst/>
+          </a:prstGeom>
+          <a:ln>
+            <a:solidFill>
+              <a:schemeClr val="tx1"/>
+            </a:solidFill>
+          </a:ln>
+        </p:spPr>
+        <p:style>
+          <a:lnRef idx="1">
+            <a:schemeClr val="accent1"/>
+          </a:lnRef>
+          <a:fillRef idx="0">
+            <a:schemeClr val="accent1"/>
+          </a:fillRef>
+          <a:effectRef idx="0">
+            <a:schemeClr val="accent1"/>
+          </a:effectRef>
+          <a:fontRef idx="minor">
+            <a:schemeClr val="tx1"/>
+          </a:fontRef>
+        </p:style>
+      </p:cxnSp>
+      <p:cxnSp>
+        <p:nvCxnSpPr>
+          <p:cNvPr id="12" name="Straight Arrow Connector 11"/>
+          <p:cNvCxnSpPr/>
+          <p:nvPr/>
+        </p:nvCxnSpPr>
+        <p:spPr>
+          <a:xfrm>
+            <a:off x="1400175" y="1543050"/>
+            <a:ext cx="0" cy="422192"/>
+          </a:xfrm>
+          <a:prstGeom prst="straightConnector1">
+            <a:avLst/>
+          </a:prstGeom>
+          <a:ln>
+            <a:solidFill>
+              <a:schemeClr val="tx1"/>
+            </a:solidFill>
+            <a:headEnd type="arrow"/>
+            <a:tailEnd type="arrow"/>
+          </a:ln>
+        </p:spPr>
+        <p:style>
+          <a:lnRef idx="1">
+            <a:schemeClr val="accent1"/>
+          </a:lnRef>
+          <a:fillRef idx="0">
+            <a:schemeClr val="accent1"/>
+          </a:fillRef>
+          <a:effectRef idx="0">
+            <a:schemeClr val="accent1"/>
+          </a:effectRef>
+          <a:fontRef idx="minor">
+            <a:schemeClr val="tx1"/>
+          </a:fontRef>
+        </p:style>
+      </p:cxnSp>
+      <p:sp>
+        <p:nvSpPr>
+          <p:cNvPr id="15" name="TextBox 14"/>
+          <p:cNvSpPr txBox="1"/>
+          <p:nvPr/>
+        </p:nvSpPr>
+        <p:spPr>
+          <a:xfrm>
+            <a:off x="1085850" y="1638300"/>
+            <a:ext cx="485775" cy="307777"/>
+          </a:xfrm>
+          <a:prstGeom prst="rect">
+            <a:avLst/>
+          </a:prstGeom>
+          <a:noFill/>
+        </p:spPr>
+        <p:txBody>
+          <a:bodyPr wrap="square" rtlCol="0">
+            <a:spAutoFit/>
+          </a:bodyPr>
+          <a:lstStyle/>
+          <a:p>
+            <a:r>
+              <a:rPr lang="en-US" sz="1400" dirty="0" smtClean="0"/>
+              <a:t>3’</a:t>
+            </a:r>
+            <a:endParaRPr lang="en-US" sz="1400" dirty="0"/>
+          </a:p>
+        </p:txBody>
+      </p:sp>
+      <p:sp>
+        <p:nvSpPr>
+          <p:cNvPr id="35" name="TextBox 34"/>
+          <p:cNvSpPr txBox="1"/>
+          <p:nvPr/>
+        </p:nvSpPr>
+        <p:spPr>
+          <a:xfrm>
+            <a:off x="3048000" y="1772056"/>
+            <a:ext cx="418704" cy="369332"/>
+          </a:xfrm>
+          <a:prstGeom prst="rect">
+            <a:avLst/>
+          </a:prstGeom>
+          <a:noFill/>
+        </p:spPr>
+        <p:txBody>
+          <a:bodyPr wrap="none" rtlCol="0">
+            <a:spAutoFit/>
+          </a:bodyPr>
+          <a:lstStyle/>
+          <a:p>
+            <a:r>
+              <a:rPr lang="en-US" b="1" dirty="0" smtClean="0"/>
+              <a:t>29</a:t>
+            </a:r>
+            <a:endParaRPr lang="en-US" b="1" dirty="0"/>
+          </a:p>
+        </p:txBody>
+      </p:sp>
+      <p:sp>
+        <p:nvSpPr>
+          <p:cNvPr id="36" name="Multiply 35"/>
+          <p:cNvSpPr/>
+          <p:nvPr/>
+        </p:nvSpPr>
+        <p:spPr>
+          <a:xfrm>
+            <a:off x="3143052" y="1391056"/>
+            <a:ext cx="228600" cy="228600"/>
+          </a:xfrm>
+          <a:prstGeom prst="mathMultiply">
+            <a:avLst/>
+          </a:prstGeom>
+          <a:solidFill>
+            <a:srgbClr val="FF0000"/>
+          </a:solidFill>
+          <a:ln>
+            <a:solidFill>
+              <a:srgbClr val="C00000"/>
+            </a:solidFill>
+          </a:ln>
+        </p:spPr>
+        <p:style>
+          <a:lnRef idx="2">
+            <a:schemeClr val="accent1">
+              <a:shade val="50000"/>
+            </a:schemeClr>
+          </a:lnRef>
+          <a:fillRef idx="1">
+            <a:schemeClr val="accent1"/>
+          </a:fillRef>
+          <a:effectRef idx="0">
+            <a:schemeClr val="accent1"/>
+          </a:effectRef>
+          <a:fontRef idx="minor">
+            <a:schemeClr val="lt1"/>
+          </a:fontRef>
+        </p:style>
+        <p:txBody>
+          <a:bodyPr rtlCol="0" anchor="ctr"/>
+          <a:lstStyle/>
+          <a:p>
+            <a:pPr algn="ctr"/>
+            <a:endParaRPr lang="en-US"/>
+          </a:p>
+        </p:txBody>
+      </p:sp>
+      <p:sp>
+        <p:nvSpPr>
+          <p:cNvPr id="40" name="TextBox 39"/>
+          <p:cNvSpPr txBox="1"/>
+          <p:nvPr/>
+        </p:nvSpPr>
+        <p:spPr>
+          <a:xfrm>
+            <a:off x="5677296" y="1770432"/>
+            <a:ext cx="418704" cy="369332"/>
+          </a:xfrm>
+          <a:prstGeom prst="rect">
+            <a:avLst/>
+          </a:prstGeom>
+          <a:noFill/>
+        </p:spPr>
+        <p:txBody>
+          <a:bodyPr wrap="none" rtlCol="0">
+            <a:spAutoFit/>
+          </a:bodyPr>
+          <a:lstStyle/>
+          <a:p>
+            <a:r>
+              <a:rPr lang="en-US" b="1" dirty="0" smtClean="0"/>
+              <a:t>30</a:t>
+            </a:r>
+            <a:endParaRPr lang="en-US" b="1" dirty="0"/>
+          </a:p>
+        </p:txBody>
+      </p:sp>
+      <p:sp>
+        <p:nvSpPr>
+          <p:cNvPr id="41" name="Multiply 40"/>
+          <p:cNvSpPr/>
+          <p:nvPr/>
+        </p:nvSpPr>
+        <p:spPr>
+          <a:xfrm>
+            <a:off x="5772348" y="1389432"/>
+            <a:ext cx="228600" cy="228600"/>
+          </a:xfrm>
+          <a:prstGeom prst="mathMultiply">
+            <a:avLst/>
+          </a:prstGeom>
+          <a:solidFill>
+            <a:srgbClr val="FF0000"/>
+          </a:solidFill>
+          <a:ln>
+            <a:solidFill>
+              <a:srgbClr val="C00000"/>
+            </a:solidFill>
+          </a:ln>
+        </p:spPr>
+        <p:style>
+          <a:lnRef idx="2">
+            <a:schemeClr val="accent1">
+              <a:shade val="50000"/>
+            </a:schemeClr>
+          </a:lnRef>
+          <a:fillRef idx="1">
+            <a:schemeClr val="accent1"/>
+          </a:fillRef>
+          <a:effectRef idx="0">
+            <a:schemeClr val="accent1"/>
+          </a:effectRef>
+          <a:fontRef idx="minor">
+            <a:schemeClr val="lt1"/>
+          </a:fontRef>
+        </p:style>
+        <p:txBody>
+          <a:bodyPr rtlCol="0" anchor="ctr"/>
+          <a:lstStyle/>
+          <a:p>
+            <a:pPr algn="ctr"/>
+            <a:endParaRPr lang="en-US"/>
           </a:p>
         </p:txBody>
       </p:sp>

</xml_diff>